<commit_message>
#325 Processed various review comments for SBE docs and FIFO example.
</commit_message>
<xml_diff>
--- a/cif/org.eclipse.escet.cif.documentation/images/synthesis-based-engineering/approaches/overview.pptx
+++ b/cif/org.eclipse.escet.cif.documentation/images/synthesis-based-engineering/approaches/overview.pptx
@@ -3118,7 +3118,7 @@
           <a:p>
             <a:fld id="{C221E696-4F56-4B84-A45D-59D0F5152707}" type="datetimeFigureOut">
               <a:rPr lang="en-US" smtClean="0"/>
-              <a:t>14-Mar-22</a:t>
+              <a:t>19-Mar-22</a:t>
             </a:fld>
             <a:endParaRPr lang="en-US"/>
           </a:p>
@@ -3359,7 +3359,7 @@
           <a:p>
             <a:fld id="{C221E696-4F56-4B84-A45D-59D0F5152707}" type="datetimeFigureOut">
               <a:rPr lang="en-US" smtClean="0"/>
-              <a:t>14-Mar-22</a:t>
+              <a:t>19-Mar-22</a:t>
             </a:fld>
             <a:endParaRPr lang="en-US"/>
           </a:p>
@@ -4013,21 +4013,27 @@
                 <a:uLnTx/>
                 <a:uFillTx/>
               </a:rPr>
-              <a:t>Realization in</a:t>
+              <a:t>Realization in software</a:t>
             </a:r>
-            <a:br>
-              <a:rPr kumimoji="0" lang="en-US" sz="1400" i="0" u="none" strike="noStrike" kern="0" cap="none" spc="0" normalizeH="0" baseline="0" noProof="0" dirty="0">
-                <a:ln>
-                  <a:noFill/>
-                </a:ln>
-                <a:solidFill>
-                  <a:srgbClr val="FFFFFF"/>
-                </a:solidFill>
-                <a:effectLst/>
-                <a:uLnTx/>
-                <a:uFillTx/>
-              </a:rPr>
-            </a:br>
+          </a:p>
+          <a:p>
+            <a:pPr marL="0" marR="0" lvl="0" indent="0" defTabSz="914400" eaLnBrk="1" fontAlgn="auto" latinLnBrk="0" hangingPunct="1">
+              <a:lnSpc>
+                <a:spcPct val="100000"/>
+              </a:lnSpc>
+              <a:spcBef>
+                <a:spcPts val="0"/>
+              </a:spcBef>
+              <a:spcAft>
+                <a:spcPts val="0"/>
+              </a:spcAft>
+              <a:buClrTx/>
+              <a:buSzTx/>
+              <a:buFontTx/>
+              <a:buNone/>
+              <a:tabLst/>
+              <a:defRPr/>
+            </a:pPr>
             <a:r>
               <a:rPr kumimoji="0" lang="en-US" sz="1400" i="0" u="none" strike="noStrike" kern="0" cap="none" spc="0" normalizeH="0" baseline="0" noProof="0" dirty="0">
                 <a:ln>
@@ -4040,7 +4046,7 @@
                 <a:uLnTx/>
                 <a:uFillTx/>
               </a:rPr>
-              <a:t>software (code)</a:t>
+              <a:t>(implementation code)</a:t>
             </a:r>
           </a:p>
         </p:txBody>
@@ -4104,7 +4110,40 @@
                 <a:uLnTx/>
                 <a:uFillTx/>
               </a:rPr>
-              <a:t>Verification (against requirements)</a:t>
+              <a:t>Verification</a:t>
+            </a:r>
+          </a:p>
+          <a:p>
+            <a:pPr marL="0" marR="0" lvl="0" indent="0" defTabSz="914400" eaLnBrk="1" fontAlgn="auto" latinLnBrk="0" hangingPunct="1">
+              <a:lnSpc>
+                <a:spcPct val="100000"/>
+              </a:lnSpc>
+              <a:spcBef>
+                <a:spcPts val="0"/>
+              </a:spcBef>
+              <a:spcAft>
+                <a:spcPts val="0"/>
+              </a:spcAft>
+              <a:buClrTx/>
+              <a:buSzTx/>
+              <a:buFontTx/>
+              <a:buNone/>
+              <a:tabLst/>
+              <a:defRPr/>
+            </a:pPr>
+            <a:r>
+              <a:rPr kumimoji="0" lang="en-US" sz="1400" i="0" u="none" strike="noStrike" kern="0" cap="none" spc="0" normalizeH="0" baseline="0" noProof="0" dirty="0">
+                <a:ln>
+                  <a:noFill/>
+                </a:ln>
+                <a:solidFill>
+                  <a:srgbClr val="FFFFFF"/>
+                </a:solidFill>
+                <a:effectLst/>
+                <a:uLnTx/>
+                <a:uFillTx/>
+              </a:rPr>
+              <a:t>(against requirements)</a:t>
             </a:r>
           </a:p>
           <a:p>
@@ -4198,7 +4237,40 @@
                 <a:uLnTx/>
                 <a:uFillTx/>
               </a:rPr>
-              <a:t>Validation (of requirements)</a:t>
+              <a:t>Validation</a:t>
+            </a:r>
+          </a:p>
+          <a:p>
+            <a:pPr marL="0" marR="0" lvl="0" indent="0" defTabSz="914400" eaLnBrk="1" fontAlgn="auto" latinLnBrk="0" hangingPunct="1">
+              <a:lnSpc>
+                <a:spcPct val="100000"/>
+              </a:lnSpc>
+              <a:spcBef>
+                <a:spcPts val="0"/>
+              </a:spcBef>
+              <a:spcAft>
+                <a:spcPts val="0"/>
+              </a:spcAft>
+              <a:buClrTx/>
+              <a:buSzTx/>
+              <a:buFontTx/>
+              <a:buNone/>
+              <a:tabLst/>
+              <a:defRPr/>
+            </a:pPr>
+            <a:r>
+              <a:rPr kumimoji="0" lang="en-US" sz="1400" i="0" u="none" strike="noStrike" kern="0" cap="none" spc="0" normalizeH="0" baseline="0" noProof="0" dirty="0">
+                <a:ln>
+                  <a:noFill/>
+                </a:ln>
+                <a:solidFill>
+                  <a:srgbClr val="FFFFFF"/>
+                </a:solidFill>
+                <a:effectLst/>
+                <a:uLnTx/>
+                <a:uFillTx/>
+              </a:rPr>
+              <a:t>(of requirements)</a:t>
             </a:r>
           </a:p>
         </p:txBody>
@@ -6289,6 +6361,109 @@
                 <a:uFillTx/>
               </a:rPr>
               <a:t>Legend:</a:t>
+            </a:r>
+          </a:p>
+        </p:txBody>
+      </p:sp>
+      <p:sp>
+        <p:nvSpPr>
+          <p:cNvPr id="67" name="TextBox 66">
+            <a:extLst>
+              <a:ext uri="{FF2B5EF4-FFF2-40B4-BE49-F238E27FC236}">
+                <a16:creationId xmlns:a16="http://schemas.microsoft.com/office/drawing/2014/main" id="{68A74E90-07E3-41B6-8CA3-7F434A9BA354}"/>
+              </a:ext>
+            </a:extLst>
+          </p:cNvPr>
+          <p:cNvSpPr txBox="1"/>
+          <p:nvPr/>
+        </p:nvSpPr>
+        <p:spPr>
+          <a:xfrm>
+            <a:off x="522692" y="1435609"/>
+            <a:ext cx="2042033" cy="215444"/>
+          </a:xfrm>
+          <a:prstGeom prst="rect">
+            <a:avLst/>
+          </a:prstGeom>
+          <a:noFill/>
+        </p:spPr>
+        <p:txBody>
+          <a:bodyPr wrap="square" lIns="0" tIns="0" rIns="0" bIns="0">
+            <a:spAutoFit/>
+          </a:bodyPr>
+          <a:lstStyle/>
+          <a:p>
+            <a:pPr algn="r"/>
+            <a:r>
+              <a:rPr lang="en-US" sz="1400" b="1" dirty="0">
+                <a:solidFill>
+                  <a:srgbClr val="00819B"/>
+                </a:solidFill>
+              </a:rPr>
+              <a:t>Engineering approach </a:t>
+            </a:r>
+            <a:r>
+              <a:rPr lang="en-US" sz="1400" b="1" dirty="0">
+                <a:solidFill>
+                  <a:srgbClr val="00819B"/>
+                </a:solidFill>
+                <a:cs typeface="Calibri" panose="020F0502020204030204" pitchFamily="34" charset="0"/>
+              </a:rPr>
+              <a:t>→</a:t>
+            </a:r>
+            <a:endParaRPr lang="en-US" sz="1400" b="1" dirty="0">
+              <a:solidFill>
+                <a:srgbClr val="00819B"/>
+              </a:solidFill>
+            </a:endParaRPr>
+          </a:p>
+        </p:txBody>
+      </p:sp>
+      <p:sp>
+        <p:nvSpPr>
+          <p:cNvPr id="68" name="TextBox 67">
+            <a:extLst>
+              <a:ext uri="{FF2B5EF4-FFF2-40B4-BE49-F238E27FC236}">
+                <a16:creationId xmlns:a16="http://schemas.microsoft.com/office/drawing/2014/main" id="{5A24566B-D3AE-472E-A796-B8B7E8952684}"/>
+              </a:ext>
+            </a:extLst>
+          </p:cNvPr>
+          <p:cNvSpPr txBox="1"/>
+          <p:nvPr/>
+        </p:nvSpPr>
+        <p:spPr>
+          <a:xfrm>
+            <a:off x="193050" y="1914460"/>
+            <a:ext cx="1719902" cy="215444"/>
+          </a:xfrm>
+          <a:prstGeom prst="rect">
+            <a:avLst/>
+          </a:prstGeom>
+          <a:noFill/>
+        </p:spPr>
+        <p:txBody>
+          <a:bodyPr wrap="square" lIns="0" tIns="0" rIns="0" bIns="0">
+            <a:spAutoFit/>
+          </a:bodyPr>
+          <a:lstStyle/>
+          <a:p>
+            <a:r>
+              <a:rPr lang="en-US" sz="1400" b="1" dirty="0">
+                <a:solidFill>
+                  <a:srgbClr val="00819B"/>
+                </a:solidFill>
+                <a:latin typeface="Calibri" panose="020F0502020204030204" pitchFamily="34" charset="0"/>
+                <a:cs typeface="Calibri" panose="020F0502020204030204" pitchFamily="34" charset="0"/>
+              </a:rPr>
+              <a:t>↓ Development s</a:t>
+            </a:r>
+            <a:r>
+              <a:rPr lang="en-US" sz="1400" b="1" dirty="0">
+                <a:solidFill>
+                  <a:srgbClr val="00819B"/>
+                </a:solidFill>
+              </a:rPr>
+              <a:t>tep</a:t>
             </a:r>
           </a:p>
         </p:txBody>

</xml_diff>

<commit_message>
#334 Fixed CIF SBE approaches figure/text inconsistency.
</commit_message>
<xml_diff>
--- a/cif/org.eclipse.escet.cif.documentation/images/synthesis-based-engineering/approaches/overview.pptx
+++ b/cif/org.eclipse.escet.cif.documentation/images/synthesis-based-engineering/approaches/overview.pptx
@@ -3118,7 +3118,7 @@
           <a:p>
             <a:fld id="{C221E696-4F56-4B84-A45D-59D0F5152707}" type="datetimeFigureOut">
               <a:rPr lang="en-US" smtClean="0"/>
-              <a:t>19-Mar-22</a:t>
+              <a:t>27-Mar-22</a:t>
             </a:fld>
             <a:endParaRPr lang="en-US"/>
           </a:p>
@@ -3359,7 +3359,7 @@
           <a:p>
             <a:fld id="{C221E696-4F56-4B84-A45D-59D0F5152707}" type="datetimeFigureOut">
               <a:rPr lang="en-US" smtClean="0"/>
-              <a:t>19-Mar-22</a:t>
+              <a:t>27-Mar-22</a:t>
             </a:fld>
             <a:endParaRPr lang="en-US"/>
           </a:p>
@@ -5560,6 +5560,50 @@
               <a:tabLst/>
               <a:defRPr/>
             </a:pPr>
+            <a:r>
+              <a:rPr lang="en-US" sz="1400" b="1" kern="0" dirty="0">
+                <a:solidFill>
+                  <a:schemeClr val="tx1">
+                    <a:lumMod val="95000"/>
+                    <a:lumOff val="5000"/>
+                  </a:schemeClr>
+                </a:solidFill>
+              </a:rPr>
+              <a:t>(model checking)</a:t>
+            </a:r>
+            <a:endParaRPr kumimoji="0" lang="en-US" sz="1400" b="1" i="0" u="none" strike="noStrike" kern="0" cap="none" spc="0" normalizeH="0" baseline="0" noProof="0" dirty="0">
+              <a:ln>
+                <a:noFill/>
+              </a:ln>
+              <a:solidFill>
+                <a:schemeClr val="tx1">
+                  <a:lumMod val="95000"/>
+                  <a:lumOff val="5000"/>
+                </a:schemeClr>
+              </a:solidFill>
+              <a:effectLst/>
+              <a:uLnTx/>
+              <a:uFillTx/>
+            </a:endParaRPr>
+          </a:p>
+          <a:p>
+            <a:pPr marL="0" marR="0" lvl="0" indent="0" defTabSz="914400" eaLnBrk="1" fontAlgn="auto" latinLnBrk="0" hangingPunct="1">
+              <a:lnSpc>
+                <a:spcPct val="100000"/>
+              </a:lnSpc>
+              <a:spcBef>
+                <a:spcPts val="0"/>
+              </a:spcBef>
+              <a:spcAft>
+                <a:spcPts val="0"/>
+              </a:spcAft>
+              <a:buClrTx/>
+              <a:buSzTx/>
+              <a:buFontTx/>
+              <a:buNone/>
+              <a:tabLst/>
+              <a:defRPr/>
+            </a:pPr>
             <a:endParaRPr kumimoji="0" lang="en-US" sz="1400" b="1" i="0" u="none" strike="noStrike" kern="0" cap="none" spc="0" normalizeH="0" baseline="0" noProof="0" dirty="0">
               <a:ln>
                 <a:noFill/>
@@ -6019,7 +6063,7 @@
                 <a:uLnTx/>
                 <a:uFillTx/>
               </a:rPr>
-              <a:t>Correct-by-design (guaranteed)</a:t>
+              <a:t>Correct-by-construction (guaranteed)</a:t>
             </a:r>
           </a:p>
           <a:p>

</xml_diff>